<commit_message>
Made minor editorial correction to page number placement.
</commit_message>
<xml_diff>
--- a/Presentations/201609-Chicago-Meeting/PSSM-initial-submission-update.pptx
+++ b/Presentations/201609-Chicago-Meeting/PSSM-initial-submission-update.pptx
@@ -242,7 +242,7 @@
 <file path=ppt/charts/chart1.xml><?xml version="1.0" encoding="utf-8"?>
 <c:chartSpace xmlns:c="http://schemas.openxmlformats.org/drawingml/2006/chart" xmlns:a="http://schemas.openxmlformats.org/drawingml/2006/main" xmlns:r="http://schemas.openxmlformats.org/officeDocument/2006/relationships">
   <c:date1904 val="0"/>
-  <c:lang val="fr-FR"/>
+  <c:lang val="en-US"/>
   <c:roundedCorners val="0"/>
   <mc:AlternateContent xmlns:mc="http://schemas.openxmlformats.org/markup-compatibility/2006">
     <mc:Choice xmlns:c14="http://schemas.microsoft.com/office/drawing/2007/8/2/chart" Requires="c14">
@@ -279,6 +279,7 @@
           </a:p>
         </c:rich>
       </c:tx>
+      <c:layout/>
       <c:overlay val="0"/>
       <c:spPr>
         <a:noFill/>
@@ -303,7 +304,7 @@
               <a:cs typeface="+mn-cs"/>
             </a:defRPr>
           </a:pPr>
-          <a:endParaRPr lang="fr-FR"/>
+          <a:endParaRPr lang="en-US"/>
         </a:p>
       </c:txPr>
     </c:title>
@@ -371,7 +372,7 @@
                     <a:cs typeface="+mn-cs"/>
                   </a:defRPr>
                 </a:pPr>
-                <a:endParaRPr lang="fr-FR"/>
+                <a:endParaRPr lang="en-US"/>
               </a:p>
             </c:txPr>
             <c:dLblPos val="ctr"/>
@@ -384,6 +385,7 @@
             <c:showLeaderLines val="0"/>
             <c:extLst>
               <c:ext xmlns:c15="http://schemas.microsoft.com/office/drawing/2012/chart" uri="{CE6537A1-D6FC-4f65-9D91-7224C49458BB}">
+                <c15:layout/>
                 <c15:showLeaderLines val="1"/>
                 <c15:leaderLines>
                   <c:spPr>
@@ -434,22 +436,22 @@
                 <c:formatCode>General</c:formatCode>
                 <c:ptCount val="6"/>
                 <c:pt idx="0">
-                  <c:v>108</c:v>
+                  <c:v>108.0</c:v>
                 </c:pt>
                 <c:pt idx="1">
-                  <c:v>108</c:v>
+                  <c:v>108.0</c:v>
                 </c:pt>
                 <c:pt idx="2">
-                  <c:v>108</c:v>
+                  <c:v>108.0</c:v>
                 </c:pt>
                 <c:pt idx="3">
-                  <c:v>108</c:v>
+                  <c:v>108.0</c:v>
                 </c:pt>
                 <c:pt idx="4">
-                  <c:v>108</c:v>
+                  <c:v>108.0</c:v>
                 </c:pt>
                 <c:pt idx="5">
-                  <c:v>108</c:v>
+                  <c:v>108.0</c:v>
                 </c:pt>
               </c:numCache>
             </c:numRef>
@@ -514,7 +516,7 @@
                     <a:cs typeface="+mn-cs"/>
                   </a:defRPr>
                 </a:pPr>
-                <a:endParaRPr lang="fr-FR"/>
+                <a:endParaRPr lang="en-US"/>
               </a:p>
             </c:txPr>
             <c:dLblPos val="ctr"/>
@@ -527,6 +529,7 @@
             <c:showLeaderLines val="0"/>
             <c:extLst>
               <c:ext xmlns:c15="http://schemas.microsoft.com/office/drawing/2012/chart" uri="{CE6537A1-D6FC-4f65-9D91-7224C49458BB}">
+                <c15:layout/>
                 <c15:showLeaderLines val="1"/>
                 <c15:leaderLines>
                   <c:spPr>
@@ -577,22 +580,22 @@
                 <c:formatCode>General</c:formatCode>
                 <c:ptCount val="6"/>
                 <c:pt idx="0">
-                  <c:v>0</c:v>
+                  <c:v>0.0</c:v>
                 </c:pt>
                 <c:pt idx="1">
-                  <c:v>41</c:v>
+                  <c:v>41.0</c:v>
                 </c:pt>
                 <c:pt idx="2">
-                  <c:v>70</c:v>
+                  <c:v>70.0</c:v>
                 </c:pt>
                 <c:pt idx="3">
-                  <c:v>88</c:v>
+                  <c:v>88.0</c:v>
                 </c:pt>
                 <c:pt idx="4">
-                  <c:v>94</c:v>
+                  <c:v>94.0</c:v>
                 </c:pt>
                 <c:pt idx="5">
-                  <c:v>108</c:v>
+                  <c:v>108.0</c:v>
                 </c:pt>
               </c:numCache>
             </c:numRef>
@@ -657,7 +660,7 @@
                     <a:cs typeface="+mn-cs"/>
                   </a:defRPr>
                 </a:pPr>
-                <a:endParaRPr lang="fr-FR"/>
+                <a:endParaRPr lang="en-US"/>
               </a:p>
             </c:txPr>
             <c:dLblPos val="ctr"/>
@@ -670,6 +673,7 @@
             <c:showLeaderLines val="0"/>
             <c:extLst>
               <c:ext xmlns:c15="http://schemas.microsoft.com/office/drawing/2012/chart" uri="{CE6537A1-D6FC-4f65-9D91-7224C49458BB}">
+                <c15:layout/>
                 <c15:showLeaderLines val="1"/>
                 <c15:leaderLines>
                   <c:spPr>
@@ -720,22 +724,22 @@
                 <c:formatCode>General</c:formatCode>
                 <c:ptCount val="6"/>
                 <c:pt idx="0">
-                  <c:v>0</c:v>
+                  <c:v>0.0</c:v>
                 </c:pt>
                 <c:pt idx="1">
-                  <c:v>15</c:v>
+                  <c:v>15.0</c:v>
                 </c:pt>
                 <c:pt idx="2">
-                  <c:v>45</c:v>
+                  <c:v>45.0</c:v>
                 </c:pt>
                 <c:pt idx="3">
-                  <c:v>87</c:v>
+                  <c:v>87.0</c:v>
                 </c:pt>
                 <c:pt idx="4">
-                  <c:v>93</c:v>
+                  <c:v>93.0</c:v>
                 </c:pt>
                 <c:pt idx="5">
-                  <c:v>108</c:v>
+                  <c:v>108.0</c:v>
                 </c:pt>
               </c:numCache>
             </c:numRef>
@@ -752,11 +756,11 @@
           <c:showBubbleSize val="0"/>
         </c:dLbls>
         <c:smooth val="0"/>
-        <c:axId val="361710232"/>
-        <c:axId val="361710624"/>
+        <c:axId val="162553504"/>
+        <c:axId val="158286064"/>
       </c:lineChart>
       <c:catAx>
-        <c:axId val="361710232"/>
+        <c:axId val="162553504"/>
         <c:scaling>
           <c:orientation val="minMax"/>
         </c:scaling>
@@ -814,10 +818,10 @@
                 <a:cs typeface="+mn-cs"/>
               </a:defRPr>
             </a:pPr>
-            <a:endParaRPr lang="fr-FR"/>
+            <a:endParaRPr lang="en-US"/>
           </a:p>
         </c:txPr>
-        <c:crossAx val="361710624"/>
+        <c:crossAx val="158286064"/>
         <c:crosses val="autoZero"/>
         <c:auto val="1"/>
         <c:lblAlgn val="ctr"/>
@@ -825,7 +829,7 @@
         <c:noMultiLvlLbl val="0"/>
       </c:catAx>
       <c:valAx>
-        <c:axId val="361710624"/>
+        <c:axId val="158286064"/>
         <c:scaling>
           <c:orientation val="minMax"/>
         </c:scaling>
@@ -883,10 +887,10 @@
                 <a:cs typeface="+mn-cs"/>
               </a:defRPr>
             </a:pPr>
-            <a:endParaRPr lang="fr-FR"/>
+            <a:endParaRPr lang="en-US"/>
           </a:p>
         </c:txPr>
-        <c:crossAx val="361710232"/>
+        <c:crossAx val="162553504"/>
         <c:crosses val="autoZero"/>
         <c:crossBetween val="between"/>
       </c:valAx>
@@ -900,6 +904,7 @@
     </c:plotArea>
     <c:legend>
       <c:legendPos val="t"/>
+      <c:layout/>
       <c:overlay val="0"/>
       <c:spPr>
         <a:noFill/>
@@ -924,7 +929,7 @@
               <a:cs typeface="+mn-cs"/>
             </a:defRPr>
           </a:pPr>
-          <a:endParaRPr lang="fr-FR"/>
+          <a:endParaRPr lang="en-US"/>
         </a:p>
       </c:txPr>
     </c:legend>
@@ -957,7 +962,7 @@
       <a:pPr>
         <a:defRPr/>
       </a:pPr>
-      <a:endParaRPr lang="fr-FR"/>
+      <a:endParaRPr lang="en-US"/>
     </a:p>
   </c:txPr>
   <c:externalData r:id="rId3">
@@ -1637,7 +1642,7 @@
           <a:p>
             <a:fld id="{875AE9CA-C14B-4E19-97C9-513406ADC593}" type="datetimeFigureOut">
               <a:rPr lang="fr-FR" smtClean="0"/>
-              <a:t>14/09/2016</a:t>
+              <a:t>15/09/2016</a:t>
             </a:fld>
             <a:endParaRPr lang="fr-FR"/>
           </a:p>
@@ -1703,7 +1708,7 @@
           <a:p>
             <a:fld id="{D9E359AC-EB57-4019-BE17-C972272DD705}" type="slidenum">
               <a:rPr lang="fr-FR" smtClean="0"/>
-              <a:t>‹N°›</a:t>
+              <a:t>‹#›</a:t>
             </a:fld>
             <a:endParaRPr lang="fr-FR"/>
           </a:p>
@@ -1832,7 +1837,7 @@
               <a:pPr>
                 <a:defRPr/>
               </a:pPr>
-              <a:t>14/09/2016</a:t>
+              <a:t>15/09/2016</a:t>
             </a:fld>
             <a:endParaRPr lang="fr-FR"/>
           </a:p>
@@ -2019,7 +2024,7 @@
               <a:pPr>
                 <a:defRPr/>
               </a:pPr>
-              <a:t>‹N°›</a:t>
+              <a:t>‹#›</a:t>
             </a:fld>
             <a:endParaRPr lang="fr-FR"/>
           </a:p>
@@ -4082,8 +4087,8 @@
         </p:nvSpPr>
         <p:spPr>
           <a:xfrm>
-            <a:off x="457200" y="6245225"/>
-            <a:ext cx="2133600" cy="476250"/>
+            <a:off x="457200" y="6473228"/>
+            <a:ext cx="2133600" cy="268139"/>
           </a:xfrm>
         </p:spPr>
         <p:txBody>
@@ -4114,8 +4119,8 @@
         </p:nvSpPr>
         <p:spPr>
           <a:xfrm>
-            <a:off x="3124200" y="6245225"/>
-            <a:ext cx="2895600" cy="476250"/>
+            <a:off x="3124200" y="6473228"/>
+            <a:ext cx="2895600" cy="268140"/>
           </a:xfrm>
         </p:spPr>
         <p:txBody>
@@ -4142,8 +4147,8 @@
         </p:nvSpPr>
         <p:spPr>
           <a:xfrm>
-            <a:off x="6553200" y="6245225"/>
-            <a:ext cx="2133600" cy="476250"/>
+            <a:off x="6553200" y="6473228"/>
+            <a:ext cx="2133600" cy="268140"/>
           </a:xfrm>
         </p:spPr>
         <p:txBody>
@@ -4157,7 +4162,7 @@
             <a:fld id="{8C53F4D0-3818-D347-966E-B96BA407C75C}" type="slidenum">
               <a:rPr lang="en-US" altLang="en-US"/>
               <a:pPr/>
-              <a:t>‹N°›</a:t>
+              <a:t>‹#›</a:t>
             </a:fld>
             <a:endParaRPr lang="en-US" altLang="en-US"/>
           </a:p>
@@ -4340,7 +4345,7 @@
             <a:fld id="{EF31F519-05A2-CB4D-82FE-1844DED01FAF}" type="slidenum">
               <a:rPr lang="en-US" altLang="en-US"/>
               <a:pPr/>
-              <a:t>‹N°›</a:t>
+              <a:t>‹#›</a:t>
             </a:fld>
             <a:endParaRPr lang="en-US" altLang="en-US"/>
           </a:p>
@@ -4533,7 +4538,7 @@
             <a:fld id="{8098CFB5-4DA6-6948-8AE1-B376C8D7D690}" type="slidenum">
               <a:rPr lang="en-US" altLang="en-US"/>
               <a:pPr/>
-              <a:t>‹N°›</a:t>
+              <a:t>‹#›</a:t>
             </a:fld>
             <a:endParaRPr lang="en-US" altLang="en-US"/>
           </a:p>
@@ -6077,7 +6082,7 @@
             <a:fld id="{24E3016D-4C6C-FC42-B389-9B6B8C67C5F0}" type="slidenum">
               <a:rPr lang="en-US" altLang="en-US"/>
               <a:pPr/>
-              <a:t>‹N°›</a:t>
+              <a:t>‹#›</a:t>
             </a:fld>
             <a:endParaRPr lang="en-US" altLang="en-US"/>
           </a:p>
@@ -6282,7 +6287,7 @@
             <a:fld id="{D703DF45-8AAC-1140-A1E5-0877B369B512}" type="slidenum">
               <a:rPr lang="en-US" altLang="en-US"/>
               <a:pPr/>
-              <a:t>‹N°›</a:t>
+              <a:t>‹#›</a:t>
             </a:fld>
             <a:endParaRPr lang="en-US" altLang="en-US"/>
           </a:p>
@@ -6527,7 +6532,7 @@
             <a:fld id="{3ACE4635-850E-0146-B633-153EE1D425D9}" type="slidenum">
               <a:rPr lang="en-US" altLang="en-US"/>
               <a:pPr/>
-              <a:t>‹N°›</a:t>
+              <a:t>‹#›</a:t>
             </a:fld>
             <a:endParaRPr lang="en-US" altLang="en-US"/>
           </a:p>
@@ -6907,7 +6912,7 @@
             <a:fld id="{7965CB45-47DB-6643-B7C7-6DF31728C16C}" type="slidenum">
               <a:rPr lang="en-US" altLang="en-US"/>
               <a:pPr/>
-              <a:t>‹N°›</a:t>
+              <a:t>‹#›</a:t>
             </a:fld>
             <a:endParaRPr lang="en-US" altLang="en-US"/>
           </a:p>
@@ -7038,7 +7043,7 @@
             <a:fld id="{9F92182E-64AA-F941-A040-F5ADA82DD3F4}" type="slidenum">
               <a:rPr lang="en-US" altLang="en-US"/>
               <a:pPr/>
-              <a:t>‹N°›</a:t>
+              <a:t>‹#›</a:t>
             </a:fld>
             <a:endParaRPr lang="en-US" altLang="en-US"/>
           </a:p>
@@ -7146,7 +7151,7 @@
             <a:fld id="{59A4A638-5E2D-DD44-BE7E-19C18BA4A01F}" type="slidenum">
               <a:rPr lang="en-US" altLang="en-US"/>
               <a:pPr/>
-              <a:t>‹N°›</a:t>
+              <a:t>‹#›</a:t>
             </a:fld>
             <a:endParaRPr lang="en-US" altLang="en-US"/>
           </a:p>
@@ -7436,7 +7441,7 @@
             <a:fld id="{74BF302E-0CEF-AF45-8C5F-763F864163E5}" type="slidenum">
               <a:rPr lang="en-US" altLang="en-US"/>
               <a:pPr/>
-              <a:t>‹N°›</a:t>
+              <a:t>‹#›</a:t>
             </a:fld>
             <a:endParaRPr lang="en-US" altLang="en-US"/>
           </a:p>
@@ -7702,7 +7707,7 @@
             <a:fld id="{C6982A93-F3B6-2C4E-88BF-0CFF9FE172DC}" type="slidenum">
               <a:rPr lang="en-US" altLang="en-US"/>
               <a:pPr/>
-              <a:t>‹N°›</a:t>
+              <a:t>‹#›</a:t>
             </a:fld>
             <a:endParaRPr lang="en-US" altLang="en-US"/>
           </a:p>
@@ -7799,7 +7804,7 @@
               </a14:hiddenEffects>
             </a:ext>
             <a:ext uri="{FAA26D3D-D897-4be2-8F04-BA451C77F1D7}">
-              <ma14:placeholderFlag xmlns:ma14="http://schemas.microsoft.com/office/mac/drawingml/2011/main" xmlns="" val="1"/>
+              <ma14:placeholderFlag xmlns:ma14="http://schemas.microsoft.com/office/mac/drawingml/2011/main" val="1"/>
             </a:ext>
           </a:extLst>
         </p:spPr>
@@ -7872,7 +7877,7 @@
               </a14:hiddenEffects>
             </a:ext>
             <a:ext uri="{FAA26D3D-D897-4be2-8F04-BA451C77F1D7}">
-              <ma14:placeholderFlag xmlns:ma14="http://schemas.microsoft.com/office/mac/drawingml/2011/main" xmlns="" val="1"/>
+              <ma14:placeholderFlag xmlns:ma14="http://schemas.microsoft.com/office/mac/drawingml/2011/main" val="1"/>
             </a:ext>
           </a:extLst>
         </p:spPr>
@@ -7973,7 +7978,7 @@
               </a14:hiddenEffects>
             </a:ext>
             <a:ext uri="{FAA26D3D-D897-4be2-8F04-BA451C77F1D7}">
-              <ma14:placeholderFlag xmlns:ma14="http://schemas.microsoft.com/office/mac/drawingml/2011/main" xmlns="" val="1"/>
+              <ma14:placeholderFlag xmlns:ma14="http://schemas.microsoft.com/office/mac/drawingml/2011/main" val="1"/>
             </a:ext>
           </a:extLst>
         </p:spPr>
@@ -8054,7 +8059,7 @@
               </a14:hiddenEffects>
             </a:ext>
             <a:ext uri="{FAA26D3D-D897-4be2-8F04-BA451C77F1D7}">
-              <ma14:placeholderFlag xmlns:ma14="http://schemas.microsoft.com/office/mac/drawingml/2011/main" xmlns="" val="1"/>
+              <ma14:placeholderFlag xmlns:ma14="http://schemas.microsoft.com/office/mac/drawingml/2011/main" val="1"/>
             </a:ext>
           </a:extLst>
         </p:spPr>
@@ -8127,7 +8132,7 @@
               </a14:hiddenEffects>
             </a:ext>
             <a:ext uri="{FAA26D3D-D897-4be2-8F04-BA451C77F1D7}">
-              <ma14:placeholderFlag xmlns:ma14="http://schemas.microsoft.com/office/mac/drawingml/2011/main" xmlns="" val="1"/>
+              <ma14:placeholderFlag xmlns:ma14="http://schemas.microsoft.com/office/mac/drawingml/2011/main" val="1"/>
             </a:ext>
           </a:extLst>
         </p:spPr>
@@ -8150,7 +8155,7 @@
             <a:fld id="{0751BE5A-F440-5A40-9A6F-164B1A9EAF2B}" type="slidenum">
               <a:rPr lang="en-US" altLang="en-US" smtClean="0"/>
               <a:pPr/>
-              <a:t>‹N°›</a:t>
+              <a:t>‹#›</a:t>
             </a:fld>
             <a:endParaRPr lang="en-US" altLang="en-US"/>
           </a:p>
@@ -16527,7 +16532,7 @@
               </a14:hiddenEffects>
             </a:ext>
             <a:ext uri="{FAA26D3D-D897-4be2-8F04-BA451C77F1D7}">
-              <ma14:placeholderFlag xmlns:ma14="http://schemas.microsoft.com/office/mac/drawingml/2011/main" xmlns="" val="1"/>
+              <ma14:placeholderFlag xmlns:ma14="http://schemas.microsoft.com/office/mac/drawingml/2011/main" val="1"/>
             </a:ext>
           </a:extLst>
         </p:spPr>
@@ -19885,7 +19890,7 @@
               </a14:hiddenEffects>
             </a:ext>
             <a:ext uri="{FAA26D3D-D897-4be2-8F04-BA451C77F1D7}">
-              <ma14:placeholderFlag xmlns:ma14="http://schemas.microsoft.com/office/mac/drawingml/2011/main" xmlns="" val="1"/>
+              <ma14:placeholderFlag xmlns:ma14="http://schemas.microsoft.com/office/mac/drawingml/2011/main" val="1"/>
             </a:ext>
           </a:extLst>
         </p:spPr>
@@ -20373,7 +20378,7 @@
               </a14:hiddenEffects>
             </a:ext>
             <a:ext uri="{FAA26D3D-D897-4be2-8F04-BA451C77F1D7}">
-              <ma14:placeholderFlag xmlns:ma14="http://schemas.microsoft.com/office/mac/drawingml/2011/main" xmlns="" val="1"/>
+              <ma14:placeholderFlag xmlns:ma14="http://schemas.microsoft.com/office/mac/drawingml/2011/main" val="1"/>
             </a:ext>
           </a:extLst>
         </p:spPr>
@@ -20960,7 +20965,7 @@
               </a14:hiddenEffects>
             </a:ext>
             <a:ext uri="{FAA26D3D-D897-4be2-8F04-BA451C77F1D7}">
-              <ma14:placeholderFlag xmlns:ma14="http://schemas.microsoft.com/office/mac/drawingml/2011/main" xmlns="" val="1"/>
+              <ma14:placeholderFlag xmlns:ma14="http://schemas.microsoft.com/office/mac/drawingml/2011/main" val="1"/>
             </a:ext>
           </a:extLst>
         </p:spPr>
@@ -22472,7 +22477,7 @@
               </a14:hiddenEffects>
             </a:ext>
             <a:ext uri="{FAA26D3D-D897-4be2-8F04-BA451C77F1D7}">
-              <ma14:placeholderFlag xmlns:ma14="http://schemas.microsoft.com/office/mac/drawingml/2011/main" xmlns="" val="1"/>
+              <ma14:placeholderFlag xmlns:ma14="http://schemas.microsoft.com/office/mac/drawingml/2011/main" val="1"/>
             </a:ext>
           </a:extLst>
         </p:spPr>
@@ -24095,7 +24100,7 @@
               </a14:hiddenEffects>
             </a:ext>
             <a:ext uri="{FAA26D3D-D897-4be2-8F04-BA451C77F1D7}">
-              <ma14:placeholderFlag xmlns:ma14="http://schemas.microsoft.com/office/mac/drawingml/2011/main" xmlns="" val="1"/>
+              <ma14:placeholderFlag xmlns:ma14="http://schemas.microsoft.com/office/mac/drawingml/2011/main" val="1"/>
             </a:ext>
           </a:extLst>
         </p:spPr>
@@ -27518,7 +27523,7 @@
               </a14:hiddenEffects>
             </a:ext>
             <a:ext uri="{FAA26D3D-D897-4be2-8F04-BA451C77F1D7}">
-              <ma14:placeholderFlag xmlns:ma14="http://schemas.microsoft.com/office/mac/drawingml/2011/main" xmlns="" val="1"/>
+              <ma14:placeholderFlag xmlns:ma14="http://schemas.microsoft.com/office/mac/drawingml/2011/main" val="1"/>
             </a:ext>
           </a:extLst>
         </p:spPr>
@@ -28109,7 +28114,7 @@
               </a14:hiddenEffects>
             </a:ext>
             <a:ext uri="{FAA26D3D-D897-4be2-8F04-BA451C77F1D7}">
-              <ma14:placeholderFlag xmlns:ma14="http://schemas.microsoft.com/office/mac/drawingml/2011/main" xmlns="" val="1"/>
+              <ma14:placeholderFlag xmlns:ma14="http://schemas.microsoft.com/office/mac/drawingml/2011/main" val="1"/>
             </a:ext>
           </a:extLst>
         </p:spPr>
@@ -29976,7 +29981,7 @@
               </a14:hiddenEffects>
             </a:ext>
             <a:ext uri="{FAA26D3D-D897-4be2-8F04-BA451C77F1D7}">
-              <ma14:placeholderFlag xmlns:ma14="http://schemas.microsoft.com/office/mac/drawingml/2011/main" xmlns="" val="1"/>
+              <ma14:placeholderFlag xmlns:ma14="http://schemas.microsoft.com/office/mac/drawingml/2011/main" val="1"/>
             </a:ext>
           </a:extLst>
         </p:spPr>
@@ -30939,7 +30944,7 @@
               </a14:hiddenEffects>
             </a:ext>
             <a:ext uri="{FAA26D3D-D897-4be2-8F04-BA451C77F1D7}">
-              <ma14:placeholderFlag xmlns:ma14="http://schemas.microsoft.com/office/mac/drawingml/2011/main" xmlns="" val="1"/>
+              <ma14:placeholderFlag xmlns:ma14="http://schemas.microsoft.com/office/mac/drawingml/2011/main" val="1"/>
             </a:ext>
           </a:extLst>
         </p:spPr>
@@ -31901,7 +31906,7 @@
               </a14:hiddenEffects>
             </a:ext>
             <a:ext uri="{FAA26D3D-D897-4be2-8F04-BA451C77F1D7}">
-              <ma14:placeholderFlag xmlns:ma14="http://schemas.microsoft.com/office/mac/drawingml/2011/main" xmlns="" val="1"/>
+              <ma14:placeholderFlag xmlns:ma14="http://schemas.microsoft.com/office/mac/drawingml/2011/main" val="1"/>
             </a:ext>
           </a:extLst>
         </p:spPr>
@@ -34202,7 +34207,7 @@
               </a14:hiddenEffects>
             </a:ext>
             <a:ext uri="{FAA26D3D-D897-4be2-8F04-BA451C77F1D7}">
-              <ma14:placeholderFlag xmlns:ma14="http://schemas.microsoft.com/office/mac/drawingml/2011/main" xmlns="" val="1"/>
+              <ma14:placeholderFlag xmlns:ma14="http://schemas.microsoft.com/office/mac/drawingml/2011/main" val="1"/>
             </a:ext>
           </a:extLst>
         </p:spPr>
@@ -34620,7 +34625,7 @@
               </a14:hiddenEffects>
             </a:ext>
             <a:ext uri="{FAA26D3D-D897-4be2-8F04-BA451C77F1D7}">
-              <ma14:placeholderFlag xmlns:ma14="http://schemas.microsoft.com/office/mac/drawingml/2011/main" xmlns="" val="1"/>
+              <ma14:placeholderFlag xmlns:ma14="http://schemas.microsoft.com/office/mac/drawingml/2011/main" val="1"/>
             </a:ext>
           </a:extLst>
         </p:spPr>

</xml_diff>